<commit_message>
Update Lab Module 1 - Authentication and authorization.pptx
</commit_message>
<xml_diff>
--- a/Presentations/Lab Module 1 - Authentication and authorization.pptx
+++ b/Presentations/Lab Module 1 - Authentication and authorization.pptx
@@ -105,6 +105,11 @@
       </a:defRPr>
     </a:lvl9pPr>
   </p:defaultTextStyle>
+  <p:extLst>
+    <p:ext uri="{EFAFB233-063F-42B5-8137-9DF3F51BA10A}">
+      <p15:sldGuideLst xmlns:p15="http://schemas.microsoft.com/office/powerpoint/2012/main"/>
+    </p:ext>
+  </p:extLst>
 </p:presentation>
 </file>
 
@@ -3510,10 +3515,16 @@
           <a:bodyPr/>
           <a:lstStyle/>
           <a:p>
-            <a:endParaRPr lang="en-GB" dirty="0">
-              <a:latin typeface="Segoe UI" panose="020B0502040204020203" pitchFamily="34" charset="0"/>
-              <a:cs typeface="Segoe UI" panose="020B0502040204020203" pitchFamily="34" charset="0"/>
-            </a:endParaRPr>
+            <a:pPr marL="0" indent="0">
+              <a:buNone/>
+            </a:pPr>
+            <a:r>
+              <a:rPr lang="en-GB" dirty="0">
+                <a:latin typeface="Segoe UI" panose="020B0502040204020203" pitchFamily="34" charset="0"/>
+                <a:cs typeface="Segoe UI" panose="020B0502040204020203" pitchFamily="34" charset="0"/>
+              </a:rPr>
+              <a:t>Connection details</a:t>
+            </a:r>
           </a:p>
         </p:txBody>
       </p:sp>
@@ -3564,6 +3575,140 @@
           </a:extLst>
         </p:spPr>
       </p:pic>
+      <p:sp>
+        <p:nvSpPr>
+          <p:cNvPr id="2" name="Rectangle: Rounded Corners 1">
+            <a:extLst>
+              <a:ext uri="{FF2B5EF4-FFF2-40B4-BE49-F238E27FC236}">
+                <a16:creationId xmlns:a16="http://schemas.microsoft.com/office/drawing/2014/main" id="{ABD94480-3B87-CD74-ED5A-49FCCC9B5E45}"/>
+              </a:ext>
+            </a:extLst>
+          </p:cNvPr>
+          <p:cNvSpPr/>
+          <p:nvPr/>
+        </p:nvSpPr>
+        <p:spPr>
+          <a:xfrm>
+            <a:off x="3548742" y="1907178"/>
+            <a:ext cx="5094515" cy="2619468"/>
+          </a:xfrm>
+          <a:prstGeom prst="roundRect">
+            <a:avLst>
+              <a:gd name="adj" fmla="val 2151"/>
+            </a:avLst>
+          </a:prstGeom>
+        </p:spPr>
+        <p:style>
+          <a:lnRef idx="1">
+            <a:schemeClr val="accent3"/>
+          </a:lnRef>
+          <a:fillRef idx="3">
+            <a:schemeClr val="accent3"/>
+          </a:fillRef>
+          <a:effectRef idx="2">
+            <a:schemeClr val="accent3"/>
+          </a:effectRef>
+          <a:fontRef idx="minor">
+            <a:schemeClr val="lt1"/>
+          </a:fontRef>
+        </p:style>
+        <p:txBody>
+          <a:bodyPr numCol="1" rtlCol="0" anchor="t"/>
+          <a:lstStyle/>
+          <a:p>
+            <a:r>
+              <a:rPr lang="en-GB" b="1" dirty="0">
+                <a:solidFill>
+                  <a:schemeClr val="tx1"/>
+                </a:solidFill>
+              </a:rPr>
+              <a:t>OSDU Instance</a:t>
+            </a:r>
+            <a:br>
+              <a:rPr lang="en-GB" dirty="0">
+                <a:solidFill>
+                  <a:schemeClr val="tx1"/>
+                </a:solidFill>
+              </a:rPr>
+            </a:br>
+            <a:r>
+              <a:rPr lang="en-GB" dirty="0">
+                <a:solidFill>
+                  <a:schemeClr val="tx1"/>
+                </a:solidFill>
+              </a:rPr>
+              <a:t>Instance:		contoso.energy.azure.com</a:t>
+            </a:r>
+          </a:p>
+          <a:p>
+            <a:r>
+              <a:rPr lang="en-GB" dirty="0">
+                <a:solidFill>
+                  <a:schemeClr val="tx1"/>
+                </a:solidFill>
+              </a:rPr>
+              <a:t>Data Partition: 	contoso-opendes</a:t>
+            </a:r>
+          </a:p>
+          <a:p>
+            <a:endParaRPr lang="en-GB" dirty="0">
+              <a:solidFill>
+                <a:schemeClr val="tx1"/>
+              </a:solidFill>
+            </a:endParaRPr>
+          </a:p>
+          <a:p>
+            <a:r>
+              <a:rPr lang="en-GB" b="1" dirty="0">
+                <a:solidFill>
+                  <a:schemeClr val="tx1"/>
+                </a:solidFill>
+              </a:rPr>
+              <a:t>IDP details</a:t>
+            </a:r>
+          </a:p>
+          <a:p>
+            <a:r>
+              <a:rPr lang="en-GB" dirty="0">
+                <a:solidFill>
+                  <a:schemeClr val="tx1"/>
+                </a:solidFill>
+              </a:rPr>
+              <a:t>Tenant ID: 	 </a:t>
+            </a:r>
+          </a:p>
+          <a:p>
+            <a:r>
+              <a:rPr lang="en-GB" dirty="0">
+                <a:solidFill>
+                  <a:schemeClr val="tx1"/>
+                </a:solidFill>
+              </a:rPr>
+              <a:t>Client ID: 		</a:t>
+            </a:r>
+          </a:p>
+          <a:p>
+            <a:r>
+              <a:rPr lang="en-GB" dirty="0">
+                <a:solidFill>
+                  <a:schemeClr val="tx1"/>
+                </a:solidFill>
+              </a:rPr>
+              <a:t>Client secret: 	</a:t>
+            </a:r>
+          </a:p>
+          <a:p>
+            <a:r>
+              <a:rPr lang="en-GB" dirty="0">
+                <a:solidFill>
+                  <a:schemeClr val="tx1"/>
+                </a:solidFill>
+              </a:rPr>
+              <a:t>Scope: 		</a:t>
+            </a:r>
+          </a:p>
+        </p:txBody>
+      </p:sp>
     </p:spTree>
     <p:extLst>
       <p:ext uri="{BB962C8B-B14F-4D97-AF65-F5344CB8AC3E}">

</xml_diff>

<commit_message>
update presentations, add base deployment file
</commit_message>
<xml_diff>
--- a/Presentations/Lab Module 1 - Authentication and authorization.pptx
+++ b/Presentations/Lab Module 1 - Authentication and authorization.pptx
@@ -3523,7 +3523,93 @@
                 <a:latin typeface="Segoe UI" panose="020B0502040204020203" pitchFamily="34" charset="0"/>
                 <a:cs typeface="Segoe UI" panose="020B0502040204020203" pitchFamily="34" charset="0"/>
               </a:rPr>
-              <a:t>Connection details</a:t>
+              <a:t>Objectives</a:t>
+            </a:r>
+          </a:p>
+          <a:p>
+            <a:pPr marL="342900" indent="-342900">
+              <a:buFont typeface="+mj-lt"/>
+              <a:buAutoNum type="arabicPeriod"/>
+            </a:pPr>
+            <a:r>
+              <a:rPr lang="en-GB" sz="1600" dirty="0">
+                <a:latin typeface="Segoe UI" panose="020B0502040204020203" pitchFamily="34" charset="0"/>
+                <a:cs typeface="Segoe UI" panose="020B0502040204020203" pitchFamily="34" charset="0"/>
+              </a:rPr>
+              <a:t>Generate and </a:t>
+            </a:r>
+            <a:r>
+              <a:rPr lang="en-GB" sz="1600">
+                <a:latin typeface="Segoe UI" panose="020B0502040204020203" pitchFamily="34" charset="0"/>
+                <a:cs typeface="Segoe UI" panose="020B0502040204020203" pitchFamily="34" charset="0"/>
+              </a:rPr>
+              <a:t>inspect your own </a:t>
+            </a:r>
+            <a:r>
+              <a:rPr lang="en-GB" sz="1600" dirty="0" err="1">
+                <a:latin typeface="Segoe UI" panose="020B0502040204020203" pitchFamily="34" charset="0"/>
+                <a:cs typeface="Segoe UI" panose="020B0502040204020203" pitchFamily="34" charset="0"/>
+              </a:rPr>
+              <a:t>Oauth</a:t>
+            </a:r>
+            <a:r>
+              <a:rPr lang="en-GB" sz="1600" dirty="0">
+                <a:latin typeface="Segoe UI" panose="020B0502040204020203" pitchFamily="34" charset="0"/>
+                <a:cs typeface="Segoe UI" panose="020B0502040204020203" pitchFamily="34" charset="0"/>
+              </a:rPr>
+              <a:t> 2.0 JWT token.</a:t>
+            </a:r>
+          </a:p>
+          <a:p>
+            <a:pPr marL="342900" indent="-342900">
+              <a:buFont typeface="+mj-lt"/>
+              <a:buAutoNum type="arabicPeriod"/>
+            </a:pPr>
+            <a:r>
+              <a:rPr lang="en-GB" sz="1600" dirty="0">
+                <a:latin typeface="Segoe UI" panose="020B0502040204020203" pitchFamily="34" charset="0"/>
+                <a:cs typeface="Segoe UI" panose="020B0502040204020203" pitchFamily="34" charset="0"/>
+              </a:rPr>
+              <a:t>Configure and successfully authenticate to Postman and </a:t>
+            </a:r>
+            <a:br>
+              <a:rPr lang="en-GB" sz="1600" dirty="0">
+                <a:latin typeface="Segoe UI" panose="020B0502040204020203" pitchFamily="34" charset="0"/>
+                <a:cs typeface="Segoe UI" panose="020B0502040204020203" pitchFamily="34" charset="0"/>
+              </a:rPr>
+            </a:br>
+            <a:r>
+              <a:rPr lang="en-GB" sz="1600" dirty="0">
+                <a:latin typeface="Segoe UI" panose="020B0502040204020203" pitchFamily="34" charset="0"/>
+                <a:cs typeface="Segoe UI" panose="020B0502040204020203" pitchFamily="34" charset="0"/>
+              </a:rPr>
+              <a:t>OSDU CLI.</a:t>
+            </a:r>
+          </a:p>
+          <a:p>
+            <a:pPr marL="342900" indent="-342900">
+              <a:buFont typeface="+mj-lt"/>
+              <a:buAutoNum type="arabicPeriod"/>
+            </a:pPr>
+            <a:r>
+              <a:rPr lang="en-GB" sz="1600" dirty="0">
+                <a:latin typeface="Segoe UI" panose="020B0502040204020203" pitchFamily="34" charset="0"/>
+                <a:cs typeface="Segoe UI" panose="020B0502040204020203" pitchFamily="34" charset="0"/>
+              </a:rPr>
+              <a:t>Ensure successful connection to OSDU instance by</a:t>
+            </a:r>
+            <a:br>
+              <a:rPr lang="en-GB" sz="1600" dirty="0">
+                <a:latin typeface="Segoe UI" panose="020B0502040204020203" pitchFamily="34" charset="0"/>
+                <a:cs typeface="Segoe UI" panose="020B0502040204020203" pitchFamily="34" charset="0"/>
+              </a:rPr>
+            </a:br>
+            <a:r>
+              <a:rPr lang="en-GB" sz="1600" dirty="0">
+                <a:latin typeface="Segoe UI" panose="020B0502040204020203" pitchFamily="34" charset="0"/>
+                <a:cs typeface="Segoe UI" panose="020B0502040204020203" pitchFamily="34" charset="0"/>
+              </a:rPr>
+              <a:t>listing your group membership through Postman and CLI.</a:t>
             </a:r>
           </a:p>
         </p:txBody>
@@ -3589,8 +3675,8 @@
         </p:nvSpPr>
         <p:spPr>
           <a:xfrm>
-            <a:off x="3548742" y="1907178"/>
-            <a:ext cx="5094515" cy="2619468"/>
+            <a:off x="7189632" y="159616"/>
+            <a:ext cx="4799168" cy="2619468"/>
           </a:xfrm>
           <a:prstGeom prst="roundRect">
             <a:avLst>
@@ -3617,7 +3703,7 @@
           <a:lstStyle/>
           <a:p>
             <a:r>
-              <a:rPr lang="en-GB" b="1" dirty="0">
+              <a:rPr lang="en-GB" b="1">
                 <a:solidFill>
                   <a:schemeClr val="tx1"/>
                 </a:solidFill>
@@ -3625,14 +3711,14 @@
               <a:t>OSDU Instance</a:t>
             </a:r>
             <a:br>
-              <a:rPr lang="en-GB" dirty="0">
+              <a:rPr lang="en-GB">
                 <a:solidFill>
                   <a:schemeClr val="tx1"/>
                 </a:solidFill>
               </a:rPr>
             </a:br>
             <a:r>
-              <a:rPr lang="en-GB" dirty="0">
+              <a:rPr lang="en-GB">
                 <a:solidFill>
                   <a:schemeClr val="tx1"/>
                 </a:solidFill>
@@ -3642,7 +3728,7 @@
           </a:p>
           <a:p>
             <a:r>
-              <a:rPr lang="en-GB" dirty="0">
+              <a:rPr lang="en-GB">
                 <a:solidFill>
                   <a:schemeClr val="tx1"/>
                 </a:solidFill>
@@ -3651,61 +3737,66 @@
             </a:r>
           </a:p>
           <a:p>
+            <a:endParaRPr lang="en-GB">
+              <a:solidFill>
+                <a:schemeClr val="tx1"/>
+              </a:solidFill>
+            </a:endParaRPr>
+          </a:p>
+          <a:p>
+            <a:r>
+              <a:rPr lang="en-GB" b="1">
+                <a:solidFill>
+                  <a:schemeClr val="tx1"/>
+                </a:solidFill>
+              </a:rPr>
+              <a:t>IDP details</a:t>
+            </a:r>
+          </a:p>
+          <a:p>
+            <a:r>
+              <a:rPr lang="en-GB">
+                <a:solidFill>
+                  <a:schemeClr val="tx1"/>
+                </a:solidFill>
+              </a:rPr>
+              <a:t>Tenant ID: 	 </a:t>
+            </a:r>
+          </a:p>
+          <a:p>
+            <a:r>
+              <a:rPr lang="en-GB">
+                <a:solidFill>
+                  <a:schemeClr val="tx1"/>
+                </a:solidFill>
+              </a:rPr>
+              <a:t>Client ID: 		</a:t>
+            </a:r>
+          </a:p>
+          <a:p>
+            <a:r>
+              <a:rPr lang="en-GB">
+                <a:solidFill>
+                  <a:schemeClr val="tx1"/>
+                </a:solidFill>
+              </a:rPr>
+              <a:t>Client secret: 	</a:t>
+            </a:r>
+          </a:p>
+          <a:p>
+            <a:r>
+              <a:rPr lang="en-GB">
+                <a:solidFill>
+                  <a:schemeClr val="tx1"/>
+                </a:solidFill>
+              </a:rPr>
+              <a:t>Scope: 		</a:t>
+            </a:r>
             <a:endParaRPr lang="en-GB" dirty="0">
               <a:solidFill>
                 <a:schemeClr val="tx1"/>
               </a:solidFill>
             </a:endParaRPr>
-          </a:p>
-          <a:p>
-            <a:r>
-              <a:rPr lang="en-GB" b="1" dirty="0">
-                <a:solidFill>
-                  <a:schemeClr val="tx1"/>
-                </a:solidFill>
-              </a:rPr>
-              <a:t>IDP details</a:t>
-            </a:r>
-          </a:p>
-          <a:p>
-            <a:r>
-              <a:rPr lang="en-GB" dirty="0">
-                <a:solidFill>
-                  <a:schemeClr val="tx1"/>
-                </a:solidFill>
-              </a:rPr>
-              <a:t>Tenant ID: 	 </a:t>
-            </a:r>
-          </a:p>
-          <a:p>
-            <a:r>
-              <a:rPr lang="en-GB" dirty="0">
-                <a:solidFill>
-                  <a:schemeClr val="tx1"/>
-                </a:solidFill>
-              </a:rPr>
-              <a:t>Client ID: 		</a:t>
-            </a:r>
-          </a:p>
-          <a:p>
-            <a:r>
-              <a:rPr lang="en-GB" dirty="0">
-                <a:solidFill>
-                  <a:schemeClr val="tx1"/>
-                </a:solidFill>
-              </a:rPr>
-              <a:t>Client secret: 	</a:t>
-            </a:r>
-          </a:p>
-          <a:p>
-            <a:r>
-              <a:rPr lang="en-GB" dirty="0">
-                <a:solidFill>
-                  <a:schemeClr val="tx1"/>
-                </a:solidFill>
-              </a:rPr>
-              <a:t>Scope: 		</a:t>
-            </a:r>
           </a:p>
         </p:txBody>
       </p:sp>

</xml_diff>